<commit_message>
[TASK] Added title page cd and cover according to new regulations
</commit_message>
<xml_diff>
--- a/CoverCDTitlePage/CD.pptx
+++ b/CoverCDTitlePage/CD.pptx
@@ -5,12 +5,11 @@
     <p:sldMasterId id="2147483648" r:id="rId1"/>
   </p:sldMasterIdLst>
   <p:notesMasterIdLst>
-    <p:notesMasterId r:id="rId5"/>
+    <p:notesMasterId r:id="rId4"/>
   </p:notesMasterIdLst>
   <p:sldIdLst>
-    <p:sldId id="256" r:id="rId2"/>
-    <p:sldId id="258" r:id="rId3"/>
-    <p:sldId id="259" r:id="rId4"/>
+    <p:sldId id="258" r:id="rId2"/>
+    <p:sldId id="259" r:id="rId3"/>
   </p:sldIdLst>
   <p:sldSz cx="7561263" cy="10693400"/>
   <p:notesSz cx="6858000" cy="9144000"/>
@@ -139,6 +138,22 @@
       </a:defRPr>
     </a:lvl9pPr>
   </p:defaultTextStyle>
+  <p:extLst>
+    <p:ext uri="{EFAFB233-063F-42B5-8137-9DF3F51BA10A}">
+      <p15:sldGuideLst xmlns:p15="http://schemas.microsoft.com/office/powerpoint/2012/main">
+        <p15:guide id="1" orient="horz" pos="3368">
+          <p15:clr>
+            <a:srgbClr val="A4A3A4"/>
+          </p15:clr>
+        </p15:guide>
+        <p15:guide id="2" pos="2382">
+          <p15:clr>
+            <a:srgbClr val="A4A3A4"/>
+          </p15:clr>
+        </p15:guide>
+      </p15:sldGuideLst>
+    </p:ext>
+  </p:extLst>
 </p:presentation>
 </file>
 
@@ -251,7 +266,7 @@
               <a:pPr>
                 <a:defRPr/>
               </a:pPr>
-              <a:t>26-05-2013</a:t>
+              <a:t>13/12/2018</a:t>
             </a:fld>
             <a:endParaRPr lang="pt-PT"/>
           </a:p>
@@ -287,7 +302,7 @@
           <a:lstStyle/>
           <a:p>
             <a:pPr lvl="0"/>
-            <a:endParaRPr lang="pt-PT" noProof="0" smtClean="0"/>
+            <a:endParaRPr lang="pt-PT" noProof="0"/>
           </a:p>
         </p:txBody>
       </p:sp>
@@ -318,35 +333,35 @@
           <a:p>
             <a:pPr lvl="0"/>
             <a:r>
-              <a:rPr lang="pt-PT" noProof="0" smtClean="0"/>
+              <a:rPr lang="pt-PT" noProof="0"/>
               <a:t>Clique para editar os estilos</a:t>
             </a:r>
           </a:p>
           <a:p>
             <a:pPr lvl="1"/>
             <a:r>
-              <a:rPr lang="pt-PT" noProof="0" smtClean="0"/>
+              <a:rPr lang="pt-PT" noProof="0"/>
               <a:t>Segundo nível</a:t>
             </a:r>
           </a:p>
           <a:p>
             <a:pPr lvl="2"/>
             <a:r>
-              <a:rPr lang="pt-PT" noProof="0" smtClean="0"/>
+              <a:rPr lang="pt-PT" noProof="0"/>
               <a:t>Terceiro nível</a:t>
             </a:r>
           </a:p>
           <a:p>
             <a:pPr lvl="3"/>
             <a:r>
-              <a:rPr lang="pt-PT" noProof="0" smtClean="0"/>
+              <a:rPr lang="pt-PT" noProof="0"/>
               <a:t>Quarto nível</a:t>
             </a:r>
           </a:p>
           <a:p>
             <a:pPr lvl="4"/>
             <a:r>
-              <a:rPr lang="pt-PT" noProof="0" smtClean="0"/>
+              <a:rPr lang="pt-PT" noProof="0"/>
               <a:t>Quinto nível</a:t>
             </a:r>
           </a:p>
@@ -439,7 +454,7 @@
               <a:pPr>
                 <a:defRPr/>
               </a:pPr>
-              <a:t>‹nº›</a:t>
+              <a:t>‹#›</a:t>
             </a:fld>
             <a:endParaRPr lang="pt-PT"/>
           </a:p>
@@ -448,7 +463,7 @@
     </p:spTree>
     <p:extLst>
       <p:ext uri="{BB962C8B-B14F-4D97-AF65-F5344CB8AC3E}">
-        <p14:creationId xmlns:p14="http://schemas.microsoft.com/office/powerpoint/2010/main" xmlns="" val="1377564620"/>
+        <p14:creationId xmlns:p14="http://schemas.microsoft.com/office/powerpoint/2010/main" val="1377564620"/>
       </p:ext>
     </p:extLst>
   </p:cSld>
@@ -616,10 +631,9 @@
           <a:lstStyle/>
           <a:p>
             <a:r>
-              <a:rPr lang="pt-PT" smtClean="0"/>
+              <a:rPr lang="pt-PT"/>
               <a:t>Clique para editar o estilo</a:t>
             </a:r>
-            <a:endParaRPr lang="pt-PT"/>
           </a:p>
         </p:txBody>
       </p:sp>
@@ -735,10 +749,9 @@
           </a:lstStyle>
           <a:p>
             <a:r>
-              <a:rPr lang="pt-PT" smtClean="0"/>
+              <a:rPr lang="pt-PT"/>
               <a:t>Faça clique para editar o estilo</a:t>
             </a:r>
-            <a:endParaRPr lang="pt-PT"/>
           </a:p>
         </p:txBody>
       </p:sp>
@@ -769,7 +782,7 @@
               <a:pPr>
                 <a:defRPr/>
               </a:pPr>
-              <a:t>26-05-2013</a:t>
+              <a:t>13/12/2018</a:t>
             </a:fld>
             <a:endParaRPr lang="pt-PT"/>
           </a:p>
@@ -828,7 +841,7 @@
               <a:pPr>
                 <a:defRPr/>
               </a:pPr>
-              <a:t>‹nº›</a:t>
+              <a:t>‹#›</a:t>
             </a:fld>
             <a:endParaRPr lang="pt-PT"/>
           </a:p>
@@ -875,10 +888,9 @@
           <a:lstStyle/>
           <a:p>
             <a:r>
-              <a:rPr lang="pt-PT" smtClean="0"/>
+              <a:rPr lang="pt-PT"/>
               <a:t>Clique para editar o estilo</a:t>
             </a:r>
-            <a:endParaRPr lang="pt-PT"/>
           </a:p>
         </p:txBody>
       </p:sp>
@@ -899,38 +911,37 @@
           <a:p>
             <a:pPr lvl="0"/>
             <a:r>
-              <a:rPr lang="pt-PT" smtClean="0"/>
+              <a:rPr lang="pt-PT"/>
               <a:t>Clique para editar os estilos</a:t>
             </a:r>
           </a:p>
           <a:p>
             <a:pPr lvl="1"/>
             <a:r>
-              <a:rPr lang="pt-PT" smtClean="0"/>
+              <a:rPr lang="pt-PT"/>
               <a:t>Segundo nível</a:t>
             </a:r>
           </a:p>
           <a:p>
             <a:pPr lvl="2"/>
             <a:r>
-              <a:rPr lang="pt-PT" smtClean="0"/>
+              <a:rPr lang="pt-PT"/>
               <a:t>Terceiro nível</a:t>
             </a:r>
           </a:p>
           <a:p>
             <a:pPr lvl="3"/>
             <a:r>
-              <a:rPr lang="pt-PT" smtClean="0"/>
+              <a:rPr lang="pt-PT"/>
               <a:t>Quarto nível</a:t>
             </a:r>
           </a:p>
           <a:p>
             <a:pPr lvl="4"/>
             <a:r>
-              <a:rPr lang="pt-PT" smtClean="0"/>
+              <a:rPr lang="pt-PT"/>
               <a:t>Quinto nível</a:t>
             </a:r>
-            <a:endParaRPr lang="pt-PT"/>
           </a:p>
         </p:txBody>
       </p:sp>
@@ -961,7 +972,7 @@
               <a:pPr>
                 <a:defRPr/>
               </a:pPr>
-              <a:t>26-05-2013</a:t>
+              <a:t>13/12/2018</a:t>
             </a:fld>
             <a:endParaRPr lang="pt-PT"/>
           </a:p>
@@ -1020,7 +1031,7 @@
               <a:pPr>
                 <a:defRPr/>
               </a:pPr>
-              <a:t>‹nº›</a:t>
+              <a:t>‹#›</a:t>
             </a:fld>
             <a:endParaRPr lang="pt-PT"/>
           </a:p>
@@ -1072,10 +1083,9 @@
           <a:lstStyle/>
           <a:p>
             <a:r>
-              <a:rPr lang="pt-PT" smtClean="0"/>
+              <a:rPr lang="pt-PT"/>
               <a:t>Clique para editar o estilo</a:t>
             </a:r>
-            <a:endParaRPr lang="pt-PT"/>
           </a:p>
         </p:txBody>
       </p:sp>
@@ -1101,38 +1111,37 @@
           <a:p>
             <a:pPr lvl="0"/>
             <a:r>
-              <a:rPr lang="pt-PT" smtClean="0"/>
+              <a:rPr lang="pt-PT"/>
               <a:t>Clique para editar os estilos</a:t>
             </a:r>
           </a:p>
           <a:p>
             <a:pPr lvl="1"/>
             <a:r>
-              <a:rPr lang="pt-PT" smtClean="0"/>
+              <a:rPr lang="pt-PT"/>
               <a:t>Segundo nível</a:t>
             </a:r>
           </a:p>
           <a:p>
             <a:pPr lvl="2"/>
             <a:r>
-              <a:rPr lang="pt-PT" smtClean="0"/>
+              <a:rPr lang="pt-PT"/>
               <a:t>Terceiro nível</a:t>
             </a:r>
           </a:p>
           <a:p>
             <a:pPr lvl="3"/>
             <a:r>
-              <a:rPr lang="pt-PT" smtClean="0"/>
+              <a:rPr lang="pt-PT"/>
               <a:t>Quarto nível</a:t>
             </a:r>
           </a:p>
           <a:p>
             <a:pPr lvl="4"/>
             <a:r>
-              <a:rPr lang="pt-PT" smtClean="0"/>
+              <a:rPr lang="pt-PT"/>
               <a:t>Quinto nível</a:t>
             </a:r>
-            <a:endParaRPr lang="pt-PT"/>
           </a:p>
         </p:txBody>
       </p:sp>
@@ -1163,7 +1172,7 @@
               <a:pPr>
                 <a:defRPr/>
               </a:pPr>
-              <a:t>26-05-2013</a:t>
+              <a:t>13/12/2018</a:t>
             </a:fld>
             <a:endParaRPr lang="pt-PT"/>
           </a:p>
@@ -1222,7 +1231,7 @@
               <a:pPr>
                 <a:defRPr/>
               </a:pPr>
-              <a:t>‹nº›</a:t>
+              <a:t>‹#›</a:t>
             </a:fld>
             <a:endParaRPr lang="pt-PT"/>
           </a:p>
@@ -1269,10 +1278,9 @@
           <a:lstStyle/>
           <a:p>
             <a:r>
-              <a:rPr lang="pt-PT" smtClean="0"/>
+              <a:rPr lang="pt-PT"/>
               <a:t>Clique para editar o estilo</a:t>
             </a:r>
-            <a:endParaRPr lang="pt-PT"/>
           </a:p>
         </p:txBody>
       </p:sp>
@@ -1293,38 +1301,37 @@
           <a:p>
             <a:pPr lvl="0"/>
             <a:r>
-              <a:rPr lang="pt-PT" smtClean="0"/>
+              <a:rPr lang="pt-PT"/>
               <a:t>Clique para editar os estilos</a:t>
             </a:r>
           </a:p>
           <a:p>
             <a:pPr lvl="1"/>
             <a:r>
-              <a:rPr lang="pt-PT" smtClean="0"/>
+              <a:rPr lang="pt-PT"/>
               <a:t>Segundo nível</a:t>
             </a:r>
           </a:p>
           <a:p>
             <a:pPr lvl="2"/>
             <a:r>
-              <a:rPr lang="pt-PT" smtClean="0"/>
+              <a:rPr lang="pt-PT"/>
               <a:t>Terceiro nível</a:t>
             </a:r>
           </a:p>
           <a:p>
             <a:pPr lvl="3"/>
             <a:r>
-              <a:rPr lang="pt-PT" smtClean="0"/>
+              <a:rPr lang="pt-PT"/>
               <a:t>Quarto nível</a:t>
             </a:r>
           </a:p>
           <a:p>
             <a:pPr lvl="4"/>
             <a:r>
-              <a:rPr lang="pt-PT" smtClean="0"/>
+              <a:rPr lang="pt-PT"/>
               <a:t>Quinto nível</a:t>
             </a:r>
-            <a:endParaRPr lang="pt-PT"/>
           </a:p>
         </p:txBody>
       </p:sp>
@@ -1355,7 +1362,7 @@
               <a:pPr>
                 <a:defRPr/>
               </a:pPr>
-              <a:t>26-05-2013</a:t>
+              <a:t>13/12/2018</a:t>
             </a:fld>
             <a:endParaRPr lang="pt-PT"/>
           </a:p>
@@ -1414,7 +1421,7 @@
               <a:pPr>
                 <a:defRPr/>
               </a:pPr>
-              <a:t>‹nº›</a:t>
+              <a:t>‹#›</a:t>
             </a:fld>
             <a:endParaRPr lang="pt-PT"/>
           </a:p>
@@ -1470,10 +1477,9 @@
           </a:lstStyle>
           <a:p>
             <a:r>
-              <a:rPr lang="pt-PT" smtClean="0"/>
+              <a:rPr lang="pt-PT"/>
               <a:t>Clique para editar o estilo</a:t>
             </a:r>
-            <a:endParaRPr lang="pt-PT"/>
           </a:p>
         </p:txBody>
       </p:sp>
@@ -1590,7 +1596,7 @@
           <a:p>
             <a:pPr lvl="0"/>
             <a:r>
-              <a:rPr lang="pt-PT" smtClean="0"/>
+              <a:rPr lang="pt-PT"/>
               <a:t>Clique para editar os estilos</a:t>
             </a:r>
           </a:p>
@@ -1623,7 +1629,7 @@
               <a:pPr>
                 <a:defRPr/>
               </a:pPr>
-              <a:t>26-05-2013</a:t>
+              <a:t>13/12/2018</a:t>
             </a:fld>
             <a:endParaRPr lang="pt-PT"/>
           </a:p>
@@ -1682,7 +1688,7 @@
               <a:pPr>
                 <a:defRPr/>
               </a:pPr>
-              <a:t>‹nº›</a:t>
+              <a:t>‹#›</a:t>
             </a:fld>
             <a:endParaRPr lang="pt-PT"/>
           </a:p>
@@ -1729,10 +1735,9 @@
           <a:lstStyle/>
           <a:p>
             <a:r>
-              <a:rPr lang="pt-PT" smtClean="0"/>
+              <a:rPr lang="pt-PT"/>
               <a:t>Clique para editar o estilo</a:t>
             </a:r>
-            <a:endParaRPr lang="pt-PT"/>
           </a:p>
         </p:txBody>
       </p:sp>
@@ -1786,38 +1791,37 @@
           <a:p>
             <a:pPr lvl="0"/>
             <a:r>
-              <a:rPr lang="pt-PT" smtClean="0"/>
+              <a:rPr lang="pt-PT"/>
               <a:t>Clique para editar os estilos</a:t>
             </a:r>
           </a:p>
           <a:p>
             <a:pPr lvl="1"/>
             <a:r>
-              <a:rPr lang="pt-PT" smtClean="0"/>
+              <a:rPr lang="pt-PT"/>
               <a:t>Segundo nível</a:t>
             </a:r>
           </a:p>
           <a:p>
             <a:pPr lvl="2"/>
             <a:r>
-              <a:rPr lang="pt-PT" smtClean="0"/>
+              <a:rPr lang="pt-PT"/>
               <a:t>Terceiro nível</a:t>
             </a:r>
           </a:p>
           <a:p>
             <a:pPr lvl="3"/>
             <a:r>
-              <a:rPr lang="pt-PT" smtClean="0"/>
+              <a:rPr lang="pt-PT"/>
               <a:t>Quarto nível</a:t>
             </a:r>
           </a:p>
           <a:p>
             <a:pPr lvl="4"/>
             <a:r>
-              <a:rPr lang="pt-PT" smtClean="0"/>
+              <a:rPr lang="pt-PT"/>
               <a:t>Quinto nível</a:t>
             </a:r>
-            <a:endParaRPr lang="pt-PT"/>
           </a:p>
         </p:txBody>
       </p:sp>
@@ -1871,38 +1875,37 @@
           <a:p>
             <a:pPr lvl="0"/>
             <a:r>
-              <a:rPr lang="pt-PT" smtClean="0"/>
+              <a:rPr lang="pt-PT"/>
               <a:t>Clique para editar os estilos</a:t>
             </a:r>
           </a:p>
           <a:p>
             <a:pPr lvl="1"/>
             <a:r>
-              <a:rPr lang="pt-PT" smtClean="0"/>
+              <a:rPr lang="pt-PT"/>
               <a:t>Segundo nível</a:t>
             </a:r>
           </a:p>
           <a:p>
             <a:pPr lvl="2"/>
             <a:r>
-              <a:rPr lang="pt-PT" smtClean="0"/>
+              <a:rPr lang="pt-PT"/>
               <a:t>Terceiro nível</a:t>
             </a:r>
           </a:p>
           <a:p>
             <a:pPr lvl="3"/>
             <a:r>
-              <a:rPr lang="pt-PT" smtClean="0"/>
+              <a:rPr lang="pt-PT"/>
               <a:t>Quarto nível</a:t>
             </a:r>
           </a:p>
           <a:p>
             <a:pPr lvl="4"/>
             <a:r>
-              <a:rPr lang="pt-PT" smtClean="0"/>
+              <a:rPr lang="pt-PT"/>
               <a:t>Quinto nível</a:t>
             </a:r>
-            <a:endParaRPr lang="pt-PT"/>
           </a:p>
         </p:txBody>
       </p:sp>
@@ -1933,7 +1936,7 @@
               <a:pPr>
                 <a:defRPr/>
               </a:pPr>
-              <a:t>26-05-2013</a:t>
+              <a:t>13/12/2018</a:t>
             </a:fld>
             <a:endParaRPr lang="pt-PT"/>
           </a:p>
@@ -1992,7 +1995,7 @@
               <a:pPr>
                 <a:defRPr/>
               </a:pPr>
-              <a:t>‹nº›</a:t>
+              <a:t>‹#›</a:t>
             </a:fld>
             <a:endParaRPr lang="pt-PT"/>
           </a:p>
@@ -2048,10 +2051,9 @@
           </a:lstStyle>
           <a:p>
             <a:r>
-              <a:rPr lang="pt-PT" smtClean="0"/>
+              <a:rPr lang="pt-PT"/>
               <a:t>Clique para editar o estilo</a:t>
             </a:r>
-            <a:endParaRPr lang="pt-PT"/>
           </a:p>
         </p:txBody>
       </p:sp>
@@ -2114,7 +2116,7 @@
           <a:p>
             <a:pPr lvl="0"/>
             <a:r>
-              <a:rPr lang="pt-PT" smtClean="0"/>
+              <a:rPr lang="pt-PT"/>
               <a:t>Clique para editar os estilos</a:t>
             </a:r>
           </a:p>
@@ -2170,38 +2172,37 @@
           <a:p>
             <a:pPr lvl="0"/>
             <a:r>
-              <a:rPr lang="pt-PT" smtClean="0"/>
+              <a:rPr lang="pt-PT"/>
               <a:t>Clique para editar os estilos</a:t>
             </a:r>
           </a:p>
           <a:p>
             <a:pPr lvl="1"/>
             <a:r>
-              <a:rPr lang="pt-PT" smtClean="0"/>
+              <a:rPr lang="pt-PT"/>
               <a:t>Segundo nível</a:t>
             </a:r>
           </a:p>
           <a:p>
             <a:pPr lvl="2"/>
             <a:r>
-              <a:rPr lang="pt-PT" smtClean="0"/>
+              <a:rPr lang="pt-PT"/>
               <a:t>Terceiro nível</a:t>
             </a:r>
           </a:p>
           <a:p>
             <a:pPr lvl="3"/>
             <a:r>
-              <a:rPr lang="pt-PT" smtClean="0"/>
+              <a:rPr lang="pt-PT"/>
               <a:t>Quarto nível</a:t>
             </a:r>
           </a:p>
           <a:p>
             <a:pPr lvl="4"/>
             <a:r>
-              <a:rPr lang="pt-PT" smtClean="0"/>
+              <a:rPr lang="pt-PT"/>
               <a:t>Quinto nível</a:t>
             </a:r>
-            <a:endParaRPr lang="pt-PT"/>
           </a:p>
         </p:txBody>
       </p:sp>
@@ -2264,7 +2265,7 @@
           <a:p>
             <a:pPr lvl="0"/>
             <a:r>
-              <a:rPr lang="pt-PT" smtClean="0"/>
+              <a:rPr lang="pt-PT"/>
               <a:t>Clique para editar os estilos</a:t>
             </a:r>
           </a:p>
@@ -2320,38 +2321,37 @@
           <a:p>
             <a:pPr lvl="0"/>
             <a:r>
-              <a:rPr lang="pt-PT" smtClean="0"/>
+              <a:rPr lang="pt-PT"/>
               <a:t>Clique para editar os estilos</a:t>
             </a:r>
           </a:p>
           <a:p>
             <a:pPr lvl="1"/>
             <a:r>
-              <a:rPr lang="pt-PT" smtClean="0"/>
+              <a:rPr lang="pt-PT"/>
               <a:t>Segundo nível</a:t>
             </a:r>
           </a:p>
           <a:p>
             <a:pPr lvl="2"/>
             <a:r>
-              <a:rPr lang="pt-PT" smtClean="0"/>
+              <a:rPr lang="pt-PT"/>
               <a:t>Terceiro nível</a:t>
             </a:r>
           </a:p>
           <a:p>
             <a:pPr lvl="3"/>
             <a:r>
-              <a:rPr lang="pt-PT" smtClean="0"/>
+              <a:rPr lang="pt-PT"/>
               <a:t>Quarto nível</a:t>
             </a:r>
           </a:p>
           <a:p>
             <a:pPr lvl="4"/>
             <a:r>
-              <a:rPr lang="pt-PT" smtClean="0"/>
+              <a:rPr lang="pt-PT"/>
               <a:t>Quinto nível</a:t>
             </a:r>
-            <a:endParaRPr lang="pt-PT"/>
           </a:p>
         </p:txBody>
       </p:sp>
@@ -2382,7 +2382,7 @@
               <a:pPr>
                 <a:defRPr/>
               </a:pPr>
-              <a:t>26-05-2013</a:t>
+              <a:t>13/12/2018</a:t>
             </a:fld>
             <a:endParaRPr lang="pt-PT"/>
           </a:p>
@@ -2441,7 +2441,7 @@
               <a:pPr>
                 <a:defRPr/>
               </a:pPr>
-              <a:t>‹nº›</a:t>
+              <a:t>‹#›</a:t>
             </a:fld>
             <a:endParaRPr lang="pt-PT"/>
           </a:p>
@@ -2488,10 +2488,9 @@
           <a:lstStyle/>
           <a:p>
             <a:r>
-              <a:rPr lang="pt-PT" smtClean="0"/>
+              <a:rPr lang="pt-PT"/>
               <a:t>Clique para editar o estilo</a:t>
             </a:r>
-            <a:endParaRPr lang="pt-PT"/>
           </a:p>
         </p:txBody>
       </p:sp>
@@ -2522,7 +2521,7 @@
               <a:pPr>
                 <a:defRPr/>
               </a:pPr>
-              <a:t>26-05-2013</a:t>
+              <a:t>13/12/2018</a:t>
             </a:fld>
             <a:endParaRPr lang="pt-PT"/>
           </a:p>
@@ -2581,7 +2580,7 @@
               <a:pPr>
                 <a:defRPr/>
               </a:pPr>
-              <a:t>‹nº›</a:t>
+              <a:t>‹#›</a:t>
             </a:fld>
             <a:endParaRPr lang="pt-PT"/>
           </a:p>
@@ -2639,7 +2638,7 @@
               <a:pPr>
                 <a:defRPr/>
               </a:pPr>
-              <a:t>26-05-2013</a:t>
+              <a:t>13/12/2018</a:t>
             </a:fld>
             <a:endParaRPr lang="pt-PT"/>
           </a:p>
@@ -2698,7 +2697,7 @@
               <a:pPr>
                 <a:defRPr/>
               </a:pPr>
-              <a:t>‹nº›</a:t>
+              <a:t>‹#›</a:t>
             </a:fld>
             <a:endParaRPr lang="pt-PT"/>
           </a:p>
@@ -2754,10 +2753,9 @@
           </a:lstStyle>
           <a:p>
             <a:r>
-              <a:rPr lang="pt-PT" smtClean="0"/>
+              <a:rPr lang="pt-PT"/>
               <a:t>Clique para editar o estilo</a:t>
             </a:r>
-            <a:endParaRPr lang="pt-PT"/>
           </a:p>
         </p:txBody>
       </p:sp>
@@ -2811,38 +2809,37 @@
           <a:p>
             <a:pPr lvl="0"/>
             <a:r>
-              <a:rPr lang="pt-PT" smtClean="0"/>
+              <a:rPr lang="pt-PT"/>
               <a:t>Clique para editar os estilos</a:t>
             </a:r>
           </a:p>
           <a:p>
             <a:pPr lvl="1"/>
             <a:r>
-              <a:rPr lang="pt-PT" smtClean="0"/>
+              <a:rPr lang="pt-PT"/>
               <a:t>Segundo nível</a:t>
             </a:r>
           </a:p>
           <a:p>
             <a:pPr lvl="2"/>
             <a:r>
-              <a:rPr lang="pt-PT" smtClean="0"/>
+              <a:rPr lang="pt-PT"/>
               <a:t>Terceiro nível</a:t>
             </a:r>
           </a:p>
           <a:p>
             <a:pPr lvl="3"/>
             <a:r>
-              <a:rPr lang="pt-PT" smtClean="0"/>
+              <a:rPr lang="pt-PT"/>
               <a:t>Quarto nível</a:t>
             </a:r>
           </a:p>
           <a:p>
             <a:pPr lvl="4"/>
             <a:r>
-              <a:rPr lang="pt-PT" smtClean="0"/>
+              <a:rPr lang="pt-PT"/>
               <a:t>Quinto nível</a:t>
             </a:r>
-            <a:endParaRPr lang="pt-PT"/>
           </a:p>
         </p:txBody>
       </p:sp>
@@ -2905,7 +2902,7 @@
           <a:p>
             <a:pPr lvl="0"/>
             <a:r>
-              <a:rPr lang="pt-PT" smtClean="0"/>
+              <a:rPr lang="pt-PT"/>
               <a:t>Clique para editar os estilos</a:t>
             </a:r>
           </a:p>
@@ -2938,7 +2935,7 @@
               <a:pPr>
                 <a:defRPr/>
               </a:pPr>
-              <a:t>26-05-2013</a:t>
+              <a:t>13/12/2018</a:t>
             </a:fld>
             <a:endParaRPr lang="pt-PT"/>
           </a:p>
@@ -2997,7 +2994,7 @@
               <a:pPr>
                 <a:defRPr/>
               </a:pPr>
-              <a:t>‹nº›</a:t>
+              <a:t>‹#›</a:t>
             </a:fld>
             <a:endParaRPr lang="pt-PT"/>
           </a:p>
@@ -3053,10 +3050,9 @@
           </a:lstStyle>
           <a:p>
             <a:r>
-              <a:rPr lang="pt-PT" smtClean="0"/>
+              <a:rPr lang="pt-PT"/>
               <a:t>Clique para editar o estilo</a:t>
             </a:r>
-            <a:endParaRPr lang="pt-PT"/>
           </a:p>
         </p:txBody>
       </p:sp>
@@ -3121,7 +3117,7 @@
           <a:p>
             <a:pPr lvl="0"/>
             <a:r>
-              <a:rPr lang="pt-PT" noProof="0" smtClean="0"/>
+              <a:rPr lang="pt-PT" noProof="0"/>
               <a:t>Clique no ícone para adicionar uma imagem</a:t>
             </a:r>
           </a:p>
@@ -3186,7 +3182,7 @@
           <a:p>
             <a:pPr lvl="0"/>
             <a:r>
-              <a:rPr lang="pt-PT" smtClean="0"/>
+              <a:rPr lang="pt-PT"/>
               <a:t>Clique para editar os estilos</a:t>
             </a:r>
           </a:p>
@@ -3219,7 +3215,7 @@
               <a:pPr>
                 <a:defRPr/>
               </a:pPr>
-              <a:t>26-05-2013</a:t>
+              <a:t>13/12/2018</a:t>
             </a:fld>
             <a:endParaRPr lang="pt-PT"/>
           </a:p>
@@ -3278,7 +3274,7 @@
               <a:pPr>
                 <a:defRPr/>
               </a:pPr>
-              <a:t>‹nº›</a:t>
+              <a:t>‹#›</a:t>
             </a:fld>
             <a:endParaRPr lang="pt-PT"/>
           </a:p>
@@ -3350,7 +3346,7 @@
           <a:p>
             <a:pPr lvl="0"/>
             <a:r>
-              <a:rPr lang="pt-PT" smtClean="0"/>
+              <a:rPr lang="pt-PT"/>
               <a:t>Clique para editar o estilo</a:t>
             </a:r>
           </a:p>
@@ -3392,35 +3388,35 @@
           <a:p>
             <a:pPr lvl="0"/>
             <a:r>
-              <a:rPr lang="pt-PT" smtClean="0"/>
+              <a:rPr lang="pt-PT"/>
               <a:t>Clique para editar os estilos</a:t>
             </a:r>
           </a:p>
           <a:p>
             <a:pPr lvl="1"/>
             <a:r>
-              <a:rPr lang="pt-PT" smtClean="0"/>
+              <a:rPr lang="pt-PT"/>
               <a:t>Segundo nível</a:t>
             </a:r>
           </a:p>
           <a:p>
             <a:pPr lvl="2"/>
             <a:r>
-              <a:rPr lang="pt-PT" smtClean="0"/>
+              <a:rPr lang="pt-PT"/>
               <a:t>Terceiro nível</a:t>
             </a:r>
           </a:p>
           <a:p>
             <a:pPr lvl="3"/>
             <a:r>
-              <a:rPr lang="pt-PT" smtClean="0"/>
+              <a:rPr lang="pt-PT"/>
               <a:t>Quarto nível</a:t>
             </a:r>
           </a:p>
           <a:p>
             <a:pPr lvl="4"/>
             <a:r>
-              <a:rPr lang="pt-PT" smtClean="0"/>
+              <a:rPr lang="pt-PT"/>
               <a:t>Quinto nível</a:t>
             </a:r>
           </a:p>
@@ -3475,7 +3471,7 @@
               <a:pPr>
                 <a:defRPr/>
               </a:pPr>
-              <a:t>26-05-2013</a:t>
+              <a:t>13/12/2018</a:t>
             </a:fld>
             <a:endParaRPr lang="pt-PT"/>
           </a:p>
@@ -3578,7 +3574,7 @@
               <a:pPr>
                 <a:defRPr/>
               </a:pPr>
-              <a:t>‹nº›</a:t>
+              <a:t>‹#›</a:t>
             </a:fld>
             <a:endParaRPr lang="pt-PT"/>
           </a:p>
@@ -3999,407 +3995,6 @@
           <a:chExt cx="0" cy="0"/>
         </a:xfrm>
       </p:grpSpPr>
-      <p:sp>
-        <p:nvSpPr>
-          <p:cNvPr id="8" name="Rectângulo 7"/>
-          <p:cNvSpPr/>
-          <p:nvPr/>
-        </p:nvSpPr>
-        <p:spPr>
-          <a:xfrm>
-            <a:off x="3204567" y="2106340"/>
-            <a:ext cx="3570208" cy="369332"/>
-          </a:xfrm>
-          <a:prstGeom prst="rect">
-            <a:avLst/>
-          </a:prstGeom>
-        </p:spPr>
-        <p:txBody>
-          <a:bodyPr wrap="none">
-            <a:spAutoFit/>
-          </a:bodyPr>
-          <a:lstStyle/>
-          <a:p>
-            <a:r>
-              <a:rPr lang="pt-PT" dirty="0" smtClean="0"/>
-              <a:t>insira uma figura alusiva ao tema</a:t>
-            </a:r>
-            <a:endParaRPr lang="pt-PT" dirty="0"/>
-          </a:p>
-        </p:txBody>
-      </p:sp>
-      <p:sp>
-        <p:nvSpPr>
-          <p:cNvPr id="9" name="CaixaDeTexto 8"/>
-          <p:cNvSpPr txBox="1"/>
-          <p:nvPr/>
-        </p:nvSpPr>
-        <p:spPr>
-          <a:xfrm rot="16200000">
-            <a:off x="5121047" y="4222309"/>
-            <a:ext cx="2736306" cy="3400913"/>
-          </a:xfrm>
-          <a:prstGeom prst="rect">
-            <a:avLst/>
-          </a:prstGeom>
-          <a:noFill/>
-        </p:spPr>
-        <p:txBody>
-          <a:bodyPr lIns="91420" tIns="45711" rIns="91420" bIns="45711">
-            <a:spAutoFit/>
-          </a:bodyPr>
-          <a:lstStyle/>
-          <a:p>
-            <a:pPr defTabSz="1501562" fontAlgn="auto">
-              <a:spcBef>
-                <a:spcPts val="0"/>
-              </a:spcBef>
-              <a:spcAft>
-                <a:spcPts val="0"/>
-              </a:spcAft>
-              <a:defRPr/>
-            </a:pPr>
-            <a:r>
-              <a:rPr lang="pt-PT" sz="21500" dirty="0" smtClean="0">
-                <a:solidFill>
-                  <a:srgbClr val="93BFEB"/>
-                </a:solidFill>
-                <a:latin typeface="Arial" pitchFamily="34" charset="0"/>
-                <a:cs typeface="Arial" pitchFamily="34" charset="0"/>
-              </a:rPr>
-              <a:t>D</a:t>
-            </a:r>
-            <a:endParaRPr lang="pt-PT" sz="21500" dirty="0">
-              <a:solidFill>
-                <a:srgbClr val="93BFEB"/>
-              </a:solidFill>
-              <a:latin typeface="Arial" pitchFamily="34" charset="0"/>
-              <a:cs typeface="Arial" pitchFamily="34" charset="0"/>
-            </a:endParaRPr>
-          </a:p>
-        </p:txBody>
-      </p:sp>
-      <p:sp>
-        <p:nvSpPr>
-          <p:cNvPr id="10" name="CaixaDeTexto 9"/>
-          <p:cNvSpPr txBox="1"/>
-          <p:nvPr/>
-        </p:nvSpPr>
-        <p:spPr>
-          <a:xfrm rot="16200000">
-            <a:off x="5301076" y="8074738"/>
-            <a:ext cx="2376264" cy="3400913"/>
-          </a:xfrm>
-          <a:prstGeom prst="rect">
-            <a:avLst/>
-          </a:prstGeom>
-          <a:noFill/>
-        </p:spPr>
-        <p:txBody>
-          <a:bodyPr lIns="91420" tIns="45711" rIns="91420" bIns="45711">
-            <a:spAutoFit/>
-          </a:bodyPr>
-          <a:lstStyle/>
-          <a:p>
-            <a:pPr defTabSz="1501562" fontAlgn="auto">
-              <a:spcBef>
-                <a:spcPts val="0"/>
-              </a:spcBef>
-              <a:spcAft>
-                <a:spcPts val="0"/>
-              </a:spcAft>
-              <a:defRPr/>
-            </a:pPr>
-            <a:r>
-              <a:rPr lang="pt-PT" sz="21500" dirty="0" smtClean="0">
-                <a:ln>
-                  <a:solidFill>
-                    <a:srgbClr val="6699FF"/>
-                  </a:solidFill>
-                </a:ln>
-                <a:solidFill>
-                  <a:srgbClr val="FFFFFF"/>
-                </a:solidFill>
-                <a:latin typeface="Arial" pitchFamily="34" charset="0"/>
-                <a:cs typeface="Arial" pitchFamily="34" charset="0"/>
-              </a:rPr>
-              <a:t>P</a:t>
-            </a:r>
-            <a:endParaRPr lang="pt-PT" sz="21500" dirty="0">
-              <a:ln>
-                <a:solidFill>
-                  <a:srgbClr val="6699FF"/>
-                </a:solidFill>
-              </a:ln>
-              <a:solidFill>
-                <a:srgbClr val="FFFFFF"/>
-              </a:solidFill>
-              <a:latin typeface="Arial" pitchFamily="34" charset="0"/>
-              <a:cs typeface="Arial" pitchFamily="34" charset="0"/>
-            </a:endParaRPr>
-          </a:p>
-        </p:txBody>
-      </p:sp>
-      <p:sp>
-        <p:nvSpPr>
-          <p:cNvPr id="11" name="Rectângulo 10"/>
-          <p:cNvSpPr/>
-          <p:nvPr/>
-        </p:nvSpPr>
-        <p:spPr>
-          <a:xfrm rot="16200000">
-            <a:off x="5701866" y="6377805"/>
-            <a:ext cx="1718700" cy="3400913"/>
-          </a:xfrm>
-          <a:prstGeom prst="rect">
-            <a:avLst/>
-          </a:prstGeom>
-        </p:spPr>
-        <p:txBody>
-          <a:bodyPr wrap="none" lIns="91420" tIns="45711" rIns="91420" bIns="45711">
-            <a:spAutoFit/>
-          </a:bodyPr>
-          <a:lstStyle/>
-          <a:p>
-            <a:pPr defTabSz="1501562" fontAlgn="auto">
-              <a:spcBef>
-                <a:spcPts val="0"/>
-              </a:spcBef>
-              <a:spcAft>
-                <a:spcPts val="0"/>
-              </a:spcAft>
-              <a:defRPr/>
-            </a:pPr>
-            <a:r>
-              <a:rPr lang="pt-PT" sz="21500" dirty="0" smtClean="0">
-                <a:ln>
-                  <a:solidFill>
-                    <a:srgbClr val="6699FF"/>
-                  </a:solidFill>
-                </a:ln>
-                <a:solidFill>
-                  <a:srgbClr val="FFFFFF"/>
-                </a:solidFill>
-                <a:latin typeface="Arial" pitchFamily="34" charset="0"/>
-                <a:cs typeface="Arial" pitchFamily="34" charset="0"/>
-              </a:rPr>
-              <a:t>h</a:t>
-            </a:r>
-            <a:endParaRPr lang="pt-PT" sz="21500" dirty="0">
-              <a:solidFill>
-                <a:srgbClr val="FFFFFF"/>
-              </a:solidFill>
-              <a:latin typeface="+mn-lt"/>
-              <a:cs typeface="+mn-cs"/>
-            </a:endParaRPr>
-          </a:p>
-        </p:txBody>
-      </p:sp>
-      <p:sp>
-        <p:nvSpPr>
-          <p:cNvPr id="12" name="Rectângulo 11"/>
-          <p:cNvSpPr/>
-          <p:nvPr/>
-        </p:nvSpPr>
-        <p:spPr>
-          <a:xfrm>
-            <a:off x="585364" y="4102993"/>
-            <a:ext cx="5338857" cy="6017032"/>
-          </a:xfrm>
-          <a:prstGeom prst="rect">
-            <a:avLst/>
-          </a:prstGeom>
-        </p:spPr>
-        <p:txBody>
-          <a:bodyPr wrap="square">
-            <a:spAutoFit/>
-          </a:bodyPr>
-          <a:lstStyle/>
-          <a:p>
-            <a:r>
-              <a:rPr lang="pt-PT" sz="3600" b="1" dirty="0" smtClean="0"/>
-              <a:t>Insira o título da </a:t>
-            </a:r>
-          </a:p>
-          <a:p>
-            <a:r>
-              <a:rPr lang="pt-PT" sz="3600" b="1" dirty="0" smtClean="0"/>
-              <a:t>tese, letra </a:t>
-            </a:r>
-            <a:r>
-              <a:rPr lang="pt-PT" sz="3600" b="1" dirty="0" err="1" smtClean="0"/>
-              <a:t>Arial</a:t>
-            </a:r>
-            <a:r>
-              <a:rPr lang="pt-PT" sz="3600" b="1" dirty="0" smtClean="0"/>
-              <a:t> </a:t>
-            </a:r>
-          </a:p>
-          <a:p>
-            <a:r>
-              <a:rPr lang="pt-PT" sz="3600" b="1" dirty="0" smtClean="0"/>
-              <a:t>Bold, tamanho </a:t>
-            </a:r>
-          </a:p>
-          <a:p>
-            <a:r>
-              <a:rPr lang="pt-PT" sz="3600" b="1" dirty="0" smtClean="0"/>
-              <a:t>ajustado a caixa </a:t>
-            </a:r>
-          </a:p>
-          <a:p>
-            <a:r>
-              <a:rPr lang="pt-PT" sz="3600" b="1" dirty="0" smtClean="0"/>
-              <a:t>de texto 12x12 </a:t>
-            </a:r>
-          </a:p>
-          <a:p>
-            <a:r>
-              <a:rPr lang="pt-PT" sz="3600" b="1" dirty="0" smtClean="0"/>
-              <a:t>cm, justificado </a:t>
-            </a:r>
-          </a:p>
-          <a:p>
-            <a:r>
-              <a:rPr lang="pt-PT" sz="3600" b="1" dirty="0" smtClean="0"/>
-              <a:t>à esquerda</a:t>
-            </a:r>
-            <a:endParaRPr lang="pt-PT" sz="1200" dirty="0" smtClean="0"/>
-          </a:p>
-          <a:p>
-            <a:endParaRPr lang="pt-PT" sz="1100" dirty="0" smtClean="0"/>
-          </a:p>
-          <a:p>
-            <a:r>
-              <a:rPr lang="pt-PT" dirty="0" smtClean="0"/>
-              <a:t>Nome do autor, </a:t>
-            </a:r>
-            <a:r>
-              <a:rPr lang="pt-PT" dirty="0" err="1" smtClean="0"/>
-              <a:t>Arial</a:t>
-            </a:r>
-            <a:r>
-              <a:rPr lang="pt-PT" dirty="0" smtClean="0"/>
-              <a:t> </a:t>
-            </a:r>
-            <a:r>
-              <a:rPr lang="pt-PT" dirty="0" err="1" smtClean="0"/>
-              <a:t>Plain</a:t>
-            </a:r>
-            <a:r>
-              <a:rPr lang="pt-PT" dirty="0" smtClean="0"/>
-              <a:t>, 18</a:t>
-            </a:r>
-          </a:p>
-          <a:p>
-            <a:r>
-              <a:rPr lang="pt-PT" sz="1200" dirty="0" smtClean="0"/>
-              <a:t>Nome do Curso, </a:t>
-            </a:r>
-            <a:r>
-              <a:rPr lang="pt-PT" sz="1200" dirty="0" err="1" smtClean="0"/>
-              <a:t>Arial</a:t>
-            </a:r>
-            <a:r>
-              <a:rPr lang="pt-PT" sz="1200" dirty="0" smtClean="0"/>
-              <a:t> Plain12</a:t>
-            </a:r>
-          </a:p>
-          <a:p>
-            <a:r>
-              <a:rPr lang="pt-PT" sz="1000" dirty="0" smtClean="0"/>
-              <a:t>Departamento, </a:t>
-            </a:r>
-            <a:r>
-              <a:rPr lang="pt-PT" sz="1000" dirty="0" err="1" smtClean="0"/>
-              <a:t>Arial</a:t>
-            </a:r>
-            <a:r>
-              <a:rPr lang="pt-PT" sz="1000" dirty="0" smtClean="0"/>
-              <a:t> </a:t>
-            </a:r>
-            <a:r>
-              <a:rPr lang="pt-PT" sz="1000" dirty="0" err="1" smtClean="0"/>
-              <a:t>Plain</a:t>
-            </a:r>
-            <a:r>
-              <a:rPr lang="pt-PT" sz="1000" dirty="0" smtClean="0"/>
-              <a:t> 10</a:t>
-            </a:r>
-          </a:p>
-          <a:p>
-            <a:r>
-              <a:rPr lang="pt-PT" sz="1000" dirty="0" smtClean="0"/>
-              <a:t>Ano</a:t>
-            </a:r>
-          </a:p>
-          <a:p>
-            <a:endParaRPr lang="pt-PT" sz="1000" dirty="0" smtClean="0"/>
-          </a:p>
-          <a:p>
-            <a:r>
-              <a:rPr lang="pt-PT" sz="1200" b="1" dirty="0" smtClean="0"/>
-              <a:t>Orientador </a:t>
-            </a:r>
-          </a:p>
-          <a:p>
-            <a:r>
-              <a:rPr lang="pt-PT" sz="1000" dirty="0" smtClean="0"/>
-              <a:t>Nome do Orientador, Categoria, </a:t>
-            </a:r>
-            <a:r>
-              <a:rPr lang="pt-PT" sz="1000" dirty="0" smtClean="0"/>
-              <a:t>Faculdade</a:t>
-            </a:r>
-            <a:endParaRPr lang="pt-PT" sz="1000" dirty="0" smtClean="0"/>
-          </a:p>
-          <a:p>
-            <a:endParaRPr lang="pt-PT" sz="1000" dirty="0" smtClean="0"/>
-          </a:p>
-          <a:p>
-            <a:r>
-              <a:rPr lang="pt-PT" sz="1200" b="1" dirty="0" err="1" smtClean="0"/>
-              <a:t>Coorientador</a:t>
-            </a:r>
-            <a:r>
-              <a:rPr lang="pt-PT" sz="1200" b="1" dirty="0" smtClean="0"/>
-              <a:t> </a:t>
-            </a:r>
-          </a:p>
-          <a:p>
-            <a:r>
-              <a:rPr lang="pt-PT" sz="1000" dirty="0" smtClean="0"/>
-              <a:t>Nome do Orientador, Categoria, Faculdade</a:t>
-            </a:r>
-            <a:endParaRPr lang="pt-PT" sz="1000" dirty="0"/>
-          </a:p>
-        </p:txBody>
-      </p:sp>
-    </p:spTree>
-  </p:cSld>
-  <p:clrMapOvr>
-    <a:masterClrMapping/>
-  </p:clrMapOvr>
-</p:sld>
-</file>
-
-<file path=ppt/slides/slide2.xml><?xml version="1.0" encoding="utf-8"?>
-<p:sld xmlns:a="http://schemas.openxmlformats.org/drawingml/2006/main" xmlns:r="http://schemas.openxmlformats.org/officeDocument/2006/relationships" xmlns:p="http://schemas.openxmlformats.org/presentationml/2006/main">
-  <p:cSld>
-    <p:spTree>
-      <p:nvGrpSpPr>
-        <p:cNvPr id="1" name=""/>
-        <p:cNvGrpSpPr/>
-        <p:nvPr/>
-      </p:nvGrpSpPr>
-      <p:grpSpPr>
-        <a:xfrm>
-          <a:off x="0" y="0"/>
-          <a:ext cx="0" cy="0"/>
-          <a:chOff x="0" y="0"/>
-          <a:chExt cx="0" cy="0"/>
-        </a:xfrm>
-      </p:grpSpPr>
       <p:grpSp>
         <p:nvGrpSpPr>
           <p:cNvPr id="24" name="Grupo 23"/>
@@ -4498,7 +4093,7 @@
                 <a:defRPr/>
               </a:pPr>
               <a:r>
-                <a:rPr lang="pt-PT" sz="5100" dirty="0" err="1" smtClean="0">
+                <a:rPr lang="pt-PT" sz="5100" dirty="0" err="1">
                   <a:ln>
                     <a:solidFill>
                       <a:srgbClr val="93BFEB"/>
@@ -4513,7 +4108,7 @@
                 <a:t>Ph</a:t>
               </a:r>
               <a:r>
-                <a:rPr lang="pt-PT" sz="5100" dirty="0" err="1" smtClean="0">
+                <a:rPr lang="pt-PT" sz="5100" dirty="0" err="1">
                   <a:solidFill>
                     <a:srgbClr val="93BFEB"/>
                   </a:solidFill>
@@ -4547,7 +4142,7 @@
         <p:spPr>
           <a:xfrm>
             <a:off x="1908423" y="5882694"/>
-            <a:ext cx="3778250" cy="400110"/>
+            <a:ext cx="3778250" cy="246221"/>
           </a:xfrm>
           <a:prstGeom prst="rect">
             <a:avLst/>
@@ -4561,17 +4156,9 @@
           <a:p>
             <a:pPr algn="ctr"/>
             <a:r>
-              <a:rPr lang="pt-PT" sz="1000" b="1" dirty="0" smtClean="0"/>
-              <a:t>Insira título da tese de doutoramento, </a:t>
-            </a:r>
-          </a:p>
-          <a:p>
-            <a:pPr algn="ctr"/>
-            <a:r>
-              <a:rPr lang="pt-PT" sz="1000" b="1" dirty="0" smtClean="0"/>
-              <a:t>letra Arial Bold, tamanho 10</a:t>
-            </a:r>
-            <a:endParaRPr lang="pt-PT" sz="1000" b="1" dirty="0"/>
+              <a:rPr lang="pt-PT" sz="1000" b="1" dirty="0"/>
+              <a:t>Obstacle Avoidance Framework based on Reach Sets</a:t>
+            </a:r>
           </a:p>
         </p:txBody>
       </p:sp>
@@ -4584,7 +4171,7 @@
         <p:spPr>
           <a:xfrm>
             <a:off x="2700511" y="6321420"/>
-            <a:ext cx="2232248" cy="969496"/>
+            <a:ext cx="2232248" cy="661720"/>
           </a:xfrm>
           <a:prstGeom prst="rect">
             <a:avLst/>
@@ -4598,34 +4185,32 @@
           <a:p>
             <a:pPr algn="ctr"/>
             <a:r>
-              <a:rPr lang="pt-PT" sz="900" dirty="0" smtClean="0"/>
-              <a:t>Nome do Autor, Arial Plain tamanho 9</a:t>
+              <a:rPr lang="pt-PT" sz="900" dirty="0"/>
+              <a:t>Alojz Gomola</a:t>
             </a:r>
           </a:p>
           <a:p>
             <a:pPr algn="ctr"/>
-            <a:endParaRPr lang="pt-PT" sz="700" dirty="0" smtClean="0"/>
+            <a:endParaRPr lang="pt-PT" sz="700" dirty="0"/>
           </a:p>
           <a:p>
             <a:pPr algn="ctr"/>
             <a:r>
-              <a:rPr lang="pt-PT" sz="700" dirty="0" smtClean="0"/>
-              <a:t>Nome do Curso, Arial Plain, 7</a:t>
+              <a:rPr lang="pt-BR" sz="700" dirty="0"/>
+              <a:t>Program Doutoral em Matemática Aplicada</a:t>
             </a:r>
           </a:p>
           <a:p>
             <a:pPr algn="ctr"/>
-            <a:endParaRPr lang="pt-PT" sz="700" dirty="0" smtClean="0"/>
+            <a:endParaRPr lang="pt-PT" sz="700" dirty="0"/>
           </a:p>
           <a:p>
             <a:pPr algn="ctr"/>
             <a:r>
-              <a:rPr lang="pt-PT" sz="700" dirty="0" smtClean="0"/>
-              <a:t>Departamento, Arial Plain, 7</a:t>
-            </a:r>
-          </a:p>
-          <a:p>
-            <a:endParaRPr lang="pt-PT" dirty="0" smtClean="0"/>
+              <a:rPr lang="pt-PT" sz="700" dirty="0"/>
+              <a:t>Departamento de Matemática</a:t>
+            </a:r>
+            <a:endParaRPr lang="pt-PT" dirty="0"/>
           </a:p>
         </p:txBody>
       </p:sp>
@@ -4638,7 +4223,7 @@
         <p:spPr>
           <a:xfrm>
             <a:off x="3542557" y="6941909"/>
-            <a:ext cx="526106" cy="276999"/>
+            <a:ext cx="524503" cy="276999"/>
           </a:xfrm>
           <a:prstGeom prst="rect">
             <a:avLst/>
@@ -4651,8 +4236,8 @@
           <a:lstStyle/>
           <a:p>
             <a:r>
-              <a:rPr lang="pt-PT" sz="1200" b="1" dirty="0" smtClean="0"/>
-              <a:t>ANO</a:t>
+              <a:rPr lang="pt-PT" sz="1200" b="1" dirty="0"/>
+              <a:t>2019</a:t>
             </a:r>
             <a:endParaRPr lang="pt-PT" sz="1200" dirty="0"/>
           </a:p>
@@ -4790,7 +4375,7 @@
 </p:sld>
 </file>
 
-<file path=ppt/slides/slide3.xml><?xml version="1.0" encoding="utf-8"?>
+<file path=ppt/slides/slide2.xml><?xml version="1.0" encoding="utf-8"?>
 <p:sld xmlns:a="http://schemas.openxmlformats.org/drawingml/2006/main" xmlns:r="http://schemas.openxmlformats.org/officeDocument/2006/relationships" xmlns:p="http://schemas.openxmlformats.org/presentationml/2006/main">
   <p:cSld>
     <p:spTree>
@@ -4879,57 +4464,47 @@
           <a:lstStyle/>
           <a:p>
             <a:r>
-              <a:rPr lang="pt-PT" sz="2000" b="1" dirty="0" smtClean="0"/>
-              <a:t>Insira o título da </a:t>
-            </a:r>
-          </a:p>
-          <a:p>
-            <a:r>
-              <a:rPr lang="pt-PT" sz="2000" b="1" dirty="0" smtClean="0"/>
-              <a:t>tese, letra </a:t>
-            </a:r>
-            <a:r>
-              <a:rPr lang="pt-PT" sz="2000" b="1" dirty="0" err="1" smtClean="0"/>
-              <a:t>Arial</a:t>
-            </a:r>
-            <a:r>
-              <a:rPr lang="pt-PT" sz="2000" b="1" dirty="0" smtClean="0"/>
+              <a:rPr lang="pt-PT" sz="2000" b="1" dirty="0"/>
+              <a:t>Obstacle </a:t>
+            </a:r>
+            <a:r>
+              <a:rPr lang="pt-PT" sz="2000" b="1" dirty="0"/>
+              <a:t>Avoidance</a:t>
+            </a:r>
+          </a:p>
+          <a:p>
+            <a:r>
+              <a:rPr lang="pt-PT" sz="2000" b="1" dirty="0"/>
               <a:t> </a:t>
             </a:r>
           </a:p>
           <a:p>
             <a:r>
-              <a:rPr lang="pt-PT" sz="2000" b="1" dirty="0" smtClean="0"/>
-              <a:t>Bold, tamanho </a:t>
-            </a:r>
-          </a:p>
-          <a:p>
-            <a:r>
-              <a:rPr lang="pt-PT" sz="2000" b="1" dirty="0" smtClean="0"/>
-              <a:t>ajustado a caixa </a:t>
-            </a:r>
-          </a:p>
-          <a:p>
-            <a:r>
-              <a:rPr lang="pt-PT" sz="2000" b="1" dirty="0" smtClean="0"/>
-              <a:t>de texto 6 x 6 </a:t>
-            </a:r>
-          </a:p>
-          <a:p>
-            <a:r>
-              <a:rPr lang="pt-PT" sz="2000" b="1" dirty="0" smtClean="0"/>
-              <a:t>cm, justificado </a:t>
-            </a:r>
-          </a:p>
-          <a:p>
-            <a:r>
-              <a:rPr lang="pt-PT" sz="2000" b="1" dirty="0" smtClean="0"/>
-              <a:t>à esquerda</a:t>
-            </a:r>
-            <a:endParaRPr lang="pt-PT" sz="900" dirty="0" smtClean="0"/>
-          </a:p>
-          <a:p>
-            <a:endParaRPr lang="pt-PT" sz="1200" dirty="0" smtClean="0"/>
+              <a:rPr lang="pt-PT" sz="2000" b="1" dirty="0"/>
+              <a:t>Framerork </a:t>
+            </a:r>
+          </a:p>
+          <a:p>
+            <a:endParaRPr lang="pt-PT" sz="2000" b="1" dirty="0"/>
+          </a:p>
+          <a:p>
+            <a:r>
+              <a:rPr lang="pt-PT" sz="2000" b="1" dirty="0"/>
+              <a:t>based on</a:t>
+            </a:r>
+          </a:p>
+          <a:p>
+            <a:endParaRPr lang="pt-PT" sz="2000" b="1" dirty="0"/>
+          </a:p>
+          <a:p>
+            <a:r>
+              <a:rPr lang="pt-PT" sz="2000" b="1" dirty="0"/>
+              <a:t>Reach Sets</a:t>
+            </a:r>
+            <a:endParaRPr lang="pt-PT" sz="900" dirty="0"/>
+          </a:p>
+          <a:p>
+            <a:endParaRPr lang="pt-PT" sz="1200" dirty="0"/>
           </a:p>
           <a:p>
             <a:pPr>
@@ -4938,16 +4513,8 @@
               </a:lnSpc>
             </a:pPr>
             <a:r>
-              <a:rPr lang="pt-PT" sz="1000" dirty="0" smtClean="0"/>
-              <a:t>Nome </a:t>
-            </a:r>
-            <a:r>
               <a:rPr lang="pt-PT" sz="1000" dirty="0"/>
-              <a:t>do autor, Arial Plain, </a:t>
-            </a:r>
-            <a:r>
-              <a:rPr lang="pt-PT" sz="1000" dirty="0" smtClean="0"/>
-              <a:t>18</a:t>
+              <a:t>Alojz Gomola</a:t>
             </a:r>
           </a:p>
           <a:p>
@@ -4957,8 +4524,8 @@
               </a:lnSpc>
             </a:pPr>
             <a:r>
-              <a:rPr lang="pt-PT" sz="800" dirty="0" smtClean="0"/>
-              <a:t>Nome do curso, Arial Plain, 12</a:t>
+              <a:rPr lang="pt-BR" sz="800" dirty="0"/>
+              <a:t>Program Doutoral em Matemática Aplicada</a:t>
             </a:r>
           </a:p>
           <a:p>
@@ -4968,8 +4535,8 @@
               </a:lnSpc>
             </a:pPr>
             <a:r>
-              <a:rPr lang="pt-PT" sz="700" dirty="0" smtClean="0"/>
-              <a:t>Departamento, Arial Plain, 7</a:t>
+              <a:rPr lang="pt-PT" sz="700" dirty="0"/>
+              <a:t>Departamento de Matemática</a:t>
             </a:r>
           </a:p>
         </p:txBody>
@@ -5059,7 +4626,7 @@
               <a:defRPr/>
             </a:pPr>
             <a:r>
-              <a:rPr lang="pt-PT" sz="9000" dirty="0" smtClean="0">
+              <a:rPr lang="pt-PT" sz="9000" dirty="0">
                 <a:ln>
                   <a:solidFill>
                     <a:srgbClr val="93BFEB"/>
@@ -5071,16 +4638,6 @@
               </a:rPr>
               <a:t>PhD</a:t>
             </a:r>
-            <a:endParaRPr lang="pt-PT" sz="9000" dirty="0">
-              <a:ln>
-                <a:solidFill>
-                  <a:srgbClr val="93BFEB"/>
-                </a:solidFill>
-              </a:ln>
-              <a:noFill/>
-              <a:latin typeface="Arial" pitchFamily="34" charset="0"/>
-              <a:cs typeface="Arial" pitchFamily="34" charset="0"/>
-            </a:endParaRPr>
           </a:p>
         </p:txBody>
       </p:sp>
@@ -5119,7 +4676,7 @@
               <a:defRPr/>
             </a:pPr>
             <a:r>
-              <a:rPr lang="pt-PT" sz="9000" dirty="0" smtClean="0">
+              <a:rPr lang="pt-PT" sz="9000" dirty="0">
                 <a:ln>
                   <a:solidFill>
                     <a:srgbClr val="93BFEB"/>
@@ -5134,7 +4691,7 @@
               <a:t>Ph</a:t>
             </a:r>
             <a:r>
-              <a:rPr lang="pt-PT" sz="9000" dirty="0" smtClean="0">
+              <a:rPr lang="pt-PT" sz="9000" dirty="0">
                 <a:ln>
                   <a:solidFill>
                     <a:srgbClr val="93BFEB"/>
@@ -5148,18 +4705,6 @@
               </a:rPr>
               <a:t>D</a:t>
             </a:r>
-            <a:endParaRPr lang="pt-PT" sz="9000" dirty="0">
-              <a:ln>
-                <a:solidFill>
-                  <a:srgbClr val="93BFEB"/>
-                </a:solidFill>
-              </a:ln>
-              <a:solidFill>
-                <a:srgbClr val="93BFEB"/>
-              </a:solidFill>
-              <a:latin typeface="Arial" pitchFamily="34" charset="0"/>
-              <a:cs typeface="Arial" pitchFamily="34" charset="0"/>
-            </a:endParaRPr>
           </a:p>
         </p:txBody>
       </p:sp>

</xml_diff>